<commit_message>
ChangedTags     Seq.toList    -> Seq.toArray
</commit_message>
<xml_diff>
--- a/DsDotNet/src/UnitTest/UnitTest.Model/ImportOfficeExample/Sample/DS_Factory.pptx
+++ b/DsDotNet/src/UnitTest/UnitTest.Model/ImportOfficeExample/Sample/DS_Factory.pptx
@@ -8768,6 +8768,25 @@
 </file>
 
 <file path=customXml/item2.xml><?xml version="1.0" encoding="utf-8"?>
+<p:properties xmlns:p="http://schemas.microsoft.com/office/2006/metadata/properties" xmlns:xsi="http://www.w3.org/2001/XMLSchema-instance" xmlns:pc="http://schemas.microsoft.com/office/infopath/2007/PartnerControls">
+  <documentManagement>
+    <_ip_UnifiedCompliancePolicyUIAction xmlns="http://schemas.microsoft.com/sharepoint/v3" xsi:nil="true"/>
+    <Image xmlns="71af3243-3dd4-4a8d-8c0d-dd76da1f02a5">
+      <Url xsi:nil="true"/>
+      <Description xsi:nil="true"/>
+    </Image>
+    <Status xmlns="71af3243-3dd4-4a8d-8c0d-dd76da1f02a5">Not started</Status>
+    <_ip_UnifiedCompliancePolicyProperties xmlns="http://schemas.microsoft.com/sharepoint/v3" xsi:nil="true"/>
+    <lcf76f155ced4ddcb4097134ff3c332f xmlns="71af3243-3dd4-4a8d-8c0d-dd76da1f02a5">
+      <Terms xmlns="http://schemas.microsoft.com/office/infopath/2007/PartnerControls"/>
+    </lcf76f155ced4ddcb4097134ff3c332f>
+    <TaxCatchAll xmlns="230e9df3-be65-4c73-a93b-d1236ebd677e"/>
+    <MediaServiceKeyPoints xmlns="71af3243-3dd4-4a8d-8c0d-dd76da1f02a5" xsi:nil="true"/>
+  </documentManagement>
+</p:properties>
+</file>
+
+<file path=customXml/item3.xml><?xml version="1.0" encoding="utf-8"?>
 <ct:contentTypeSchema xmlns:ct="http://schemas.microsoft.com/office/2006/metadata/contentType" xmlns:ma="http://schemas.microsoft.com/office/2006/metadata/properties/metaAttributes" ct:_="" ma:_="" ma:contentTypeName="Document" ma:contentTypeID="0x01010079F111ED35F8CC479449609E8A0923A6" ma:contentTypeVersion="18" ma:contentTypeDescription="Create a new document." ma:contentTypeScope="" ma:versionID="22a266b9fa9a230c5a512669d8b298c3">
   <xsd:schema xmlns:xsd="http://www.w3.org/2001/XMLSchema" xmlns:xs="http://www.w3.org/2001/XMLSchema" xmlns:p="http://schemas.microsoft.com/office/2006/metadata/properties" xmlns:ns1="http://schemas.microsoft.com/sharepoint/v3" xmlns:ns2="71af3243-3dd4-4a8d-8c0d-dd76da1f02a5" xmlns:ns3="16c05727-aa75-4e4a-9b5f-8a80a1165891" xmlns:ns4="230e9df3-be65-4c73-a93b-d1236ebd677e" targetNamespace="http://schemas.microsoft.com/office/2006/metadata/properties" ma:root="true" ma:fieldsID="eddc33fff6b14141ee5c74a0d29ea6a1" ns1:_="" ns2:_="" ns3:_="" ns4:_="">
     <xsd:import namespace="http://schemas.microsoft.com/sharepoint/v3"/>
@@ -9043,25 +9062,6 @@
 </ct:contentTypeSchema>
 </file>
 
-<file path=customXml/item3.xml><?xml version="1.0" encoding="utf-8"?>
-<p:properties xmlns:p="http://schemas.microsoft.com/office/2006/metadata/properties" xmlns:xsi="http://www.w3.org/2001/XMLSchema-instance" xmlns:pc="http://schemas.microsoft.com/office/infopath/2007/PartnerControls">
-  <documentManagement>
-    <_ip_UnifiedCompliancePolicyUIAction xmlns="http://schemas.microsoft.com/sharepoint/v3" xsi:nil="true"/>
-    <Image xmlns="71af3243-3dd4-4a8d-8c0d-dd76da1f02a5">
-      <Url xsi:nil="true"/>
-      <Description xsi:nil="true"/>
-    </Image>
-    <Status xmlns="71af3243-3dd4-4a8d-8c0d-dd76da1f02a5">Not started</Status>
-    <_ip_UnifiedCompliancePolicyProperties xmlns="http://schemas.microsoft.com/sharepoint/v3" xsi:nil="true"/>
-    <lcf76f155ced4ddcb4097134ff3c332f xmlns="71af3243-3dd4-4a8d-8c0d-dd76da1f02a5">
-      <Terms xmlns="http://schemas.microsoft.com/office/infopath/2007/PartnerControls"/>
-    </lcf76f155ced4ddcb4097134ff3c332f>
-    <TaxCatchAll xmlns="230e9df3-be65-4c73-a93b-d1236ebd677e"/>
-    <MediaServiceKeyPoints xmlns="71af3243-3dd4-4a8d-8c0d-dd76da1f02a5" xsi:nil="true"/>
-  </documentManagement>
-</p:properties>
-</file>
-
 <file path=customXml/itemProps1.xml><?xml version="1.0" encoding="utf-8"?>
 <ds:datastoreItem xmlns:ds="http://schemas.openxmlformats.org/officeDocument/2006/customXml" ds:itemID="{904751AB-E840-446F-8D49-E697067EC887}">
   <ds:schemaRefs>
@@ -9071,6 +9071,25 @@
 </file>
 
 <file path=customXml/itemProps2.xml><?xml version="1.0" encoding="utf-8"?>
+<ds:datastoreItem xmlns:ds="http://schemas.openxmlformats.org/officeDocument/2006/customXml" ds:itemID="{50811A92-D464-4AC4-A396-BA73B10CEEAC}">
+  <ds:schemaRefs>
+    <ds:schemaRef ds:uri="http://purl.org/dc/terms/"/>
+    <ds:schemaRef ds:uri="http://schemas.microsoft.com/office/2006/metadata/properties"/>
+    <ds:schemaRef ds:uri="http://schemas.microsoft.com/office/2006/documentManagement/types"/>
+    <ds:schemaRef ds:uri="http://purl.org/dc/dcmitype/"/>
+    <ds:schemaRef ds:uri="16c05727-aa75-4e4a-9b5f-8a80a1165891"/>
+    <ds:schemaRef ds:uri="230e9df3-be65-4c73-a93b-d1236ebd677e"/>
+    <ds:schemaRef ds:uri="http://schemas.microsoft.com/office/infopath/2007/PartnerControls"/>
+    <ds:schemaRef ds:uri="http://schemas.openxmlformats.org/package/2006/metadata/core-properties"/>
+    <ds:schemaRef ds:uri="http://purl.org/dc/elements/1.1/"/>
+    <ds:schemaRef ds:uri="71af3243-3dd4-4a8d-8c0d-dd76da1f02a5"/>
+    <ds:schemaRef ds:uri="http://schemas.microsoft.com/sharepoint/v3"/>
+    <ds:schemaRef ds:uri="http://www.w3.org/XML/1998/namespace"/>
+  </ds:schemaRefs>
+</ds:datastoreItem>
+</file>
+
+<file path=customXml/itemProps3.xml><?xml version="1.0" encoding="utf-8"?>
 <ds:datastoreItem xmlns:ds="http://schemas.openxmlformats.org/officeDocument/2006/customXml" ds:itemID="{DE4876F9-7AE1-498D-B8FE-1E3AD703D2AF}">
   <ds:schemaRefs>
     <ds:schemaRef ds:uri="http://schemas.microsoft.com/office/2006/metadata/contentType"/>
@@ -9091,25 +9110,6 @@
 </ds:datastoreItem>
 </file>
 
-<file path=customXml/itemProps3.xml><?xml version="1.0" encoding="utf-8"?>
-<ds:datastoreItem xmlns:ds="http://schemas.openxmlformats.org/officeDocument/2006/customXml" ds:itemID="{50811A92-D464-4AC4-A396-BA73B10CEEAC}">
-  <ds:schemaRefs>
-    <ds:schemaRef ds:uri="http://purl.org/dc/terms/"/>
-    <ds:schemaRef ds:uri="http://schemas.microsoft.com/office/2006/metadata/properties"/>
-    <ds:schemaRef ds:uri="http://schemas.microsoft.com/office/2006/documentManagement/types"/>
-    <ds:schemaRef ds:uri="http://purl.org/dc/dcmitype/"/>
-    <ds:schemaRef ds:uri="16c05727-aa75-4e4a-9b5f-8a80a1165891"/>
-    <ds:schemaRef ds:uri="230e9df3-be65-4c73-a93b-d1236ebd677e"/>
-    <ds:schemaRef ds:uri="http://schemas.microsoft.com/office/infopath/2007/PartnerControls"/>
-    <ds:schemaRef ds:uri="http://schemas.openxmlformats.org/package/2006/metadata/core-properties"/>
-    <ds:schemaRef ds:uri="http://purl.org/dc/elements/1.1/"/>
-    <ds:schemaRef ds:uri="71af3243-3dd4-4a8d-8c0d-dd76da1f02a5"/>
-    <ds:schemaRef ds:uri="http://schemas.microsoft.com/sharepoint/v3"/>
-    <ds:schemaRef ds:uri="http://www.w3.org/XML/1998/namespace"/>
-  </ds:schemaRefs>
-</ds:datastoreItem>
-</file>
-
 <file path=docMetadata/LabelInfo.xml><?xml version="1.0" encoding="utf-8"?>
 <clbl:labelList xmlns:clbl="http://schemas.microsoft.com/office/2020/mipLabelMetadata">
   <clbl:label id="{f42aa342-8706-4288-bd11-ebb85995028c}" enabled="1" method="Standard" siteId="{72f988bf-86f1-41af-91ab-2d7cd011db47}" contentBits="0" removed="0"/>

</xml_diff>